<commit_message>
Se agregaron más conclusiones y se corrigieron ortografía
</commit_message>
<xml_diff>
--- a/PM1.pptx
+++ b/PM1.pptx
@@ -13,6 +13,7 @@
     <p:sldId id="261" r:id="rId7"/>
     <p:sldId id="262" r:id="rId8"/>
     <p:sldId id="263" r:id="rId9"/>
+    <p:sldId id="264" r:id="rId10"/>
   </p:sldIdLst>
   <p:sldSz cx="12192000" cy="6858000"/>
   <p:notesSz cx="6858000" cy="9144000"/>
@@ -312,6 +313,53 @@
           <pc:docMk/>
           <pc:sldMk cId="1277014554" sldId="256"/>
         </pc:sldMkLst>
+      </pc:sldChg>
+    </pc:docChg>
+  </pc:docChgLst>
+  <pc:docChgLst>
+    <pc:chgData userId="c0f6b87b69e675a4" providerId="LiveId" clId="{ED7E7AD0-DC7A-4346-AA1C-AC09144653EA}"/>
+    <pc:docChg chg="addSld modSld">
+      <pc:chgData name="" userId="c0f6b87b69e675a4" providerId="LiveId" clId="{ED7E7AD0-DC7A-4346-AA1C-AC09144653EA}" dt="2019-10-01T02:08:19.136" v="3"/>
+      <pc:docMkLst>
+        <pc:docMk/>
+      </pc:docMkLst>
+      <pc:sldChg chg="addSp">
+        <pc:chgData name="" userId="c0f6b87b69e675a4" providerId="LiveId" clId="{ED7E7AD0-DC7A-4346-AA1C-AC09144653EA}" dt="2019-10-01T02:08:19.136" v="3"/>
+        <pc:sldMkLst>
+          <pc:docMk/>
+          <pc:sldMk cId="3525617992" sldId="257"/>
+        </pc:sldMkLst>
+        <pc:spChg chg="add">
+          <ac:chgData name="" userId="c0f6b87b69e675a4" providerId="LiveId" clId="{ED7E7AD0-DC7A-4346-AA1C-AC09144653EA}" dt="2019-10-01T02:08:19.136" v="3"/>
+          <ac:spMkLst>
+            <pc:docMk/>
+            <pc:sldMk cId="3525617992" sldId="257"/>
+            <ac:spMk id="4" creationId="{A717D533-FEC7-4908-8A08-57CF9FBDEB2A}"/>
+          </ac:spMkLst>
+        </pc:spChg>
+      </pc:sldChg>
+      <pc:sldChg chg="modSp add">
+        <pc:chgData name="" userId="c0f6b87b69e675a4" providerId="LiveId" clId="{ED7E7AD0-DC7A-4346-AA1C-AC09144653EA}" dt="2019-10-01T02:07:38.779" v="2"/>
+        <pc:sldMkLst>
+          <pc:docMk/>
+          <pc:sldMk cId="3358498806" sldId="264"/>
+        </pc:sldMkLst>
+        <pc:spChg chg="mod">
+          <ac:chgData name="" userId="c0f6b87b69e675a4" providerId="LiveId" clId="{ED7E7AD0-DC7A-4346-AA1C-AC09144653EA}" dt="2019-10-01T02:07:38.779" v="2"/>
+          <ac:spMkLst>
+            <pc:docMk/>
+            <pc:sldMk cId="3358498806" sldId="264"/>
+            <ac:spMk id="2" creationId="{6AF984F7-EE68-4E25-B2F9-8EB1DB473869}"/>
+          </ac:spMkLst>
+        </pc:spChg>
+        <pc:spChg chg="mod">
+          <ac:chgData name="" userId="c0f6b87b69e675a4" providerId="LiveId" clId="{ED7E7AD0-DC7A-4346-AA1C-AC09144653EA}" dt="2019-10-01T02:07:30.475" v="1"/>
+          <ac:spMkLst>
+            <pc:docMk/>
+            <pc:sldMk cId="3358498806" sldId="264"/>
+            <ac:spMk id="3" creationId="{0D190EFA-FC89-459B-88E0-625A4DE7D69E}"/>
+          </ac:spMkLst>
+        </pc:spChg>
       </pc:sldChg>
     </pc:docChg>
   </pc:docChgLst>
@@ -4051,6 +4099,40 @@
           </a:p>
         </p:txBody>
       </p:sp>
+      <p:sp>
+        <p:nvSpPr>
+          <p:cNvPr id="4" name="Título 1">
+            <a:extLst>
+              <a:ext uri="{FF2B5EF4-FFF2-40B4-BE49-F238E27FC236}">
+                <a16:creationId xmlns:a16="http://schemas.microsoft.com/office/drawing/2014/main" id="{A717D533-FEC7-4908-8A08-57CF9FBDEB2A}"/>
+              </a:ext>
+            </a:extLst>
+          </p:cNvPr>
+          <p:cNvSpPr>
+            <a:spLocks noGrp="1"/>
+          </p:cNvSpPr>
+          <p:nvPr>
+            <p:ph type="title"/>
+          </p:nvPr>
+        </p:nvSpPr>
+        <p:spPr>
+          <a:xfrm>
+            <a:off x="1451579" y="804519"/>
+            <a:ext cx="9603275" cy="1049235"/>
+          </a:xfrm>
+        </p:spPr>
+        <p:txBody>
+          <a:bodyPr/>
+          <a:lstStyle/>
+          <a:p>
+            <a:r>
+              <a:rPr lang="es-MX" dirty="0" err="1"/>
+              <a:t>Descripcion</a:t>
+            </a:r>
+            <a:endParaRPr lang="es-MX" dirty="0"/>
+          </a:p>
+        </p:txBody>
+      </p:sp>
     </p:spTree>
     <p:extLst>
       <p:ext uri="{BB962C8B-B14F-4D97-AF65-F5344CB8AC3E}">
@@ -5442,7 +5524,7 @@
           <a:p>
             <a:r>
               <a:rPr lang="es-MX" dirty="0"/>
-              <a:t>Fabricando alimentos con los siguientes componentes.243 de VEG2 y .756 de OIL1, tendríamos una ganancia de 127.56($/ton)</a:t>
+              <a:t>Fabricando alimentos con los siguientes componentes.243 de VEG2 y .756 de OIL1, tendríamos una ganancia de 127.56($/ton).</a:t>
             </a:r>
           </a:p>
         </p:txBody>
@@ -5451,6 +5533,109 @@
     <p:extLst>
       <p:ext uri="{BB962C8B-B14F-4D97-AF65-F5344CB8AC3E}">
         <p14:creationId xmlns:p14="http://schemas.microsoft.com/office/powerpoint/2010/main" val="3826928259"/>
+      </p:ext>
+    </p:extLst>
+  </p:cSld>
+  <p:clrMapOvr>
+    <a:masterClrMapping/>
+  </p:clrMapOvr>
+</p:sld>
+</file>
+
+<file path=ppt/slides/slide9.xml><?xml version="1.0" encoding="utf-8"?>
+<p:sld xmlns:a="http://schemas.openxmlformats.org/drawingml/2006/main" xmlns:r="http://schemas.openxmlformats.org/officeDocument/2006/relationships" xmlns:p="http://schemas.openxmlformats.org/presentationml/2006/main">
+  <p:cSld>
+    <p:spTree>
+      <p:nvGrpSpPr>
+        <p:cNvPr id="1" name=""/>
+        <p:cNvGrpSpPr/>
+        <p:nvPr/>
+      </p:nvGrpSpPr>
+      <p:grpSpPr>
+        <a:xfrm>
+          <a:off x="0" y="0"/>
+          <a:ext cx="0" cy="0"/>
+          <a:chOff x="0" y="0"/>
+          <a:chExt cx="0" cy="0"/>
+        </a:xfrm>
+      </p:grpSpPr>
+      <p:sp>
+        <p:nvSpPr>
+          <p:cNvPr id="2" name="Título 1">
+            <a:extLst>
+              <a:ext uri="{FF2B5EF4-FFF2-40B4-BE49-F238E27FC236}">
+                <a16:creationId xmlns:a16="http://schemas.microsoft.com/office/drawing/2014/main" id="{6AF984F7-EE68-4E25-B2F9-8EB1DB473869}"/>
+              </a:ext>
+            </a:extLst>
+          </p:cNvPr>
+          <p:cNvSpPr>
+            <a:spLocks noGrp="1"/>
+          </p:cNvSpPr>
+          <p:nvPr>
+            <p:ph type="title"/>
+          </p:nvPr>
+        </p:nvSpPr>
+        <p:spPr/>
+        <p:txBody>
+          <a:bodyPr/>
+          <a:lstStyle/>
+          <a:p>
+            <a:r>
+              <a:rPr lang="es-MX" dirty="0"/>
+              <a:t>Conclusiones resultados</a:t>
+            </a:r>
+          </a:p>
+        </p:txBody>
+      </p:sp>
+      <p:sp>
+        <p:nvSpPr>
+          <p:cNvPr id="3" name="Marcador de contenido 2">
+            <a:extLst>
+              <a:ext uri="{FF2B5EF4-FFF2-40B4-BE49-F238E27FC236}">
+                <a16:creationId xmlns:a16="http://schemas.microsoft.com/office/drawing/2014/main" id="{0D190EFA-FC89-459B-88E0-625A4DE7D69E}"/>
+              </a:ext>
+            </a:extLst>
+          </p:cNvPr>
+          <p:cNvSpPr>
+            <a:spLocks noGrp="1"/>
+          </p:cNvSpPr>
+          <p:nvPr>
+            <p:ph idx="1"/>
+          </p:nvPr>
+        </p:nvSpPr>
+        <p:spPr/>
+        <p:txBody>
+          <a:bodyPr/>
+          <a:lstStyle/>
+          <a:p>
+            <a:r>
+              <a:rPr lang="es-MX" dirty="0"/>
+              <a:t>- La Fabricación de alimentos con aceites No Vegetales es más del doble que los Vegetales, esto nos dice que la mayor ganancias proviene del OIL por la función objetivo; lo que concluimos con esto es que la demanda del OIL debe de irse </a:t>
+            </a:r>
+            <a:r>
+              <a:rPr lang="es-MX" dirty="0" err="1"/>
+              <a:t>igualanado</a:t>
+            </a:r>
+            <a:r>
+              <a:rPr lang="es-MX" dirty="0"/>
+              <a:t> a la del aceite Vegetal para tener un consumo de alimentos más sano.</a:t>
+            </a:r>
+          </a:p>
+          <a:p>
+            <a:endParaRPr lang="es-MX" dirty="0"/>
+          </a:p>
+          <a:p>
+            <a:r>
+              <a:rPr lang="es-MX" dirty="0"/>
+              <a:t>- Las ganancias máximas durante los primeros 6 meses del año no son tan buenas.</a:t>
+            </a:r>
+          </a:p>
+        </p:txBody>
+      </p:sp>
+    </p:spTree>
+    <p:extLst>
+      <p:ext uri="{BB962C8B-B14F-4D97-AF65-F5344CB8AC3E}">
+        <p14:creationId xmlns:p14="http://schemas.microsoft.com/office/powerpoint/2010/main" val="3358498806"/>
       </p:ext>
     </p:extLst>
   </p:cSld>

</xml_diff>

<commit_message>
Se corrigieron faltas de ortografía y se hicieron unos ultimos arreglos
</commit_message>
<xml_diff>
--- a/PM1.pptx
+++ b/PM1.pptx
@@ -311,10 +311,25 @@
   <pc:docChgLst>
     <pc:chgData name="PRECIADO RODRIGUEZ, JAVIER ALEJANDRO" userId="99c69099-2671-48a8-960c-05a040ef0d22" providerId="ADAL" clId="{8578E937-974E-4E87-A457-ED6538B6D45A}"/>
     <pc:docChg chg="modSld">
-      <pc:chgData name="PRECIADO RODRIGUEZ, JAVIER ALEJANDRO" userId="99c69099-2671-48a8-960c-05a040ef0d22" providerId="ADAL" clId="{8578E937-974E-4E87-A457-ED6538B6D45A}" dt="2019-10-01T02:26:57.091" v="1" actId="20577"/>
+      <pc:chgData name="PRECIADO RODRIGUEZ, JAVIER ALEJANDRO" userId="99c69099-2671-48a8-960c-05a040ef0d22" providerId="ADAL" clId="{8578E937-974E-4E87-A457-ED6538B6D45A}" dt="2019-10-02T12:11:37.842" v="8" actId="20577"/>
       <pc:docMkLst>
         <pc:docMk/>
       </pc:docMkLst>
+      <pc:sldChg chg="modSp">
+        <pc:chgData name="PRECIADO RODRIGUEZ, JAVIER ALEJANDRO" userId="99c69099-2671-48a8-960c-05a040ef0d22" providerId="ADAL" clId="{8578E937-974E-4E87-A457-ED6538B6D45A}" dt="2019-10-02T12:11:37.842" v="8" actId="20577"/>
+        <pc:sldMkLst>
+          <pc:docMk/>
+          <pc:sldMk cId="3826928259" sldId="263"/>
+        </pc:sldMkLst>
+        <pc:spChg chg="mod">
+          <ac:chgData name="PRECIADO RODRIGUEZ, JAVIER ALEJANDRO" userId="99c69099-2671-48a8-960c-05a040ef0d22" providerId="ADAL" clId="{8578E937-974E-4E87-A457-ED6538B6D45A}" dt="2019-10-02T12:11:37.842" v="8" actId="20577"/>
+          <ac:spMkLst>
+            <pc:docMk/>
+            <pc:sldMk cId="3826928259" sldId="263"/>
+            <ac:spMk id="3" creationId="{F48C1912-3E9C-473C-AED3-FED3E4248979}"/>
+          </ac:spMkLst>
+        </pc:spChg>
+      </pc:sldChg>
       <pc:sldChg chg="modSp">
         <pc:chgData name="PRECIADO RODRIGUEZ, JAVIER ALEJANDRO" userId="99c69099-2671-48a8-960c-05a040ef0d22" providerId="ADAL" clId="{8578E937-974E-4E87-A457-ED6538B6D45A}" dt="2019-10-01T02:26:57.091" v="1" actId="20577"/>
         <pc:sldMkLst>
@@ -537,7 +552,7 @@
           <a:p>
             <a:fld id="{3FFC972C-A864-4DD8-BBF1-6BDB292035BC}" type="datetimeFigureOut">
               <a:rPr lang="es-MX" smtClean="0"/>
-              <a:t>01/10/2019</a:t>
+              <a:t>02/10/2019</a:t>
             </a:fld>
             <a:endParaRPr lang="es-MX"/>
           </a:p>
@@ -748,7 +763,7 @@
           <a:p>
             <a:fld id="{3FFC972C-A864-4DD8-BBF1-6BDB292035BC}" type="datetimeFigureOut">
               <a:rPr lang="es-MX" smtClean="0"/>
-              <a:t>01/10/2019</a:t>
+              <a:t>02/10/2019</a:t>
             </a:fld>
             <a:endParaRPr lang="es-MX"/>
           </a:p>
@@ -963,7 +978,7 @@
           <a:p>
             <a:fld id="{3FFC972C-A864-4DD8-BBF1-6BDB292035BC}" type="datetimeFigureOut">
               <a:rPr lang="es-MX" smtClean="0"/>
-              <a:t>01/10/2019</a:t>
+              <a:t>02/10/2019</a:t>
             </a:fld>
             <a:endParaRPr lang="es-MX"/>
           </a:p>
@@ -1164,7 +1179,7 @@
           <a:p>
             <a:fld id="{3FFC972C-A864-4DD8-BBF1-6BDB292035BC}" type="datetimeFigureOut">
               <a:rPr lang="es-MX" smtClean="0"/>
-              <a:t>01/10/2019</a:t>
+              <a:t>02/10/2019</a:t>
             </a:fld>
             <a:endParaRPr lang="es-MX"/>
           </a:p>
@@ -1443,7 +1458,7 @@
           <a:p>
             <a:fld id="{3FFC972C-A864-4DD8-BBF1-6BDB292035BC}" type="datetimeFigureOut">
               <a:rPr lang="es-MX" smtClean="0"/>
-              <a:t>01/10/2019</a:t>
+              <a:t>02/10/2019</a:t>
             </a:fld>
             <a:endParaRPr lang="es-MX"/>
           </a:p>
@@ -1711,7 +1726,7 @@
           <a:p>
             <a:fld id="{3FFC972C-A864-4DD8-BBF1-6BDB292035BC}" type="datetimeFigureOut">
               <a:rPr lang="es-MX" smtClean="0"/>
-              <a:t>01/10/2019</a:t>
+              <a:t>02/10/2019</a:t>
             </a:fld>
             <a:endParaRPr lang="es-MX"/>
           </a:p>
@@ -2127,7 +2142,7 @@
           <a:p>
             <a:fld id="{3FFC972C-A864-4DD8-BBF1-6BDB292035BC}" type="datetimeFigureOut">
               <a:rPr lang="es-MX" smtClean="0"/>
-              <a:t>01/10/2019</a:t>
+              <a:t>02/10/2019</a:t>
             </a:fld>
             <a:endParaRPr lang="es-MX"/>
           </a:p>
@@ -2276,7 +2291,7 @@
           <a:p>
             <a:fld id="{3FFC972C-A864-4DD8-BBF1-6BDB292035BC}" type="datetimeFigureOut">
               <a:rPr lang="es-MX" smtClean="0"/>
-              <a:t>01/10/2019</a:t>
+              <a:t>02/10/2019</a:t>
             </a:fld>
             <a:endParaRPr lang="es-MX"/>
           </a:p>
@@ -2402,7 +2417,7 @@
           <a:p>
             <a:fld id="{3FFC972C-A864-4DD8-BBF1-6BDB292035BC}" type="datetimeFigureOut">
               <a:rPr lang="es-MX" smtClean="0"/>
-              <a:t>01/10/2019</a:t>
+              <a:t>02/10/2019</a:t>
             </a:fld>
             <a:endParaRPr lang="es-MX"/>
           </a:p>
@@ -2653,7 +2668,7 @@
           <a:p>
             <a:fld id="{3FFC972C-A864-4DD8-BBF1-6BDB292035BC}" type="datetimeFigureOut">
               <a:rPr lang="es-MX" smtClean="0"/>
-              <a:t>01/10/2019</a:t>
+              <a:t>02/10/2019</a:t>
             </a:fld>
             <a:endParaRPr lang="es-MX"/>
           </a:p>
@@ -3098,7 +3113,7 @@
           <a:p>
             <a:fld id="{3FFC972C-A864-4DD8-BBF1-6BDB292035BC}" type="datetimeFigureOut">
               <a:rPr lang="es-MX" smtClean="0"/>
-              <a:t>01/10/2019</a:t>
+              <a:t>02/10/2019</a:t>
             </a:fld>
             <a:endParaRPr lang="es-MX"/>
           </a:p>
@@ -3424,7 +3439,7 @@
           <a:p>
             <a:fld id="{3FFC972C-A864-4DD8-BBF1-6BDB292035BC}" type="datetimeFigureOut">
               <a:rPr lang="es-MX" smtClean="0"/>
-              <a:t>01/10/2019</a:t>
+              <a:t>02/10/2019</a:t>
             </a:fld>
             <a:endParaRPr lang="es-MX"/>
           </a:p>
@@ -5556,7 +5571,7 @@
           <a:p>
             <a:r>
               <a:rPr lang="es-MX" dirty="0"/>
-              <a:t>Fabricando alimentos con los siguientes componentes.243 de VEG2 y .756 de OIL1, tendríamos una ganancia de 127.56($/ton).</a:t>
+              <a:t>Fabricando alimentos con los siguientes componentes.243 de VEG2 y .756 de OIL1, tendríamos una ganancia de 127.56.</a:t>
             </a:r>
           </a:p>
         </p:txBody>
@@ -5650,12 +5665,8 @@
           </a:p>
           <a:p>
             <a:r>
-              <a:rPr lang="es-MX"/>
-              <a:t>Las </a:t>
-            </a:r>
-            <a:r>
               <a:rPr lang="es-MX" dirty="0"/>
-              <a:t>ganancias máximas durante los primeros 6 meses del año no son tan buenas.</a:t>
+              <a:t>Las ganancias máximas durante los primeros 6 meses del año no son tan buenas.</a:t>
             </a:r>
           </a:p>
         </p:txBody>

</xml_diff>